<commit_message>
Finalisation API / Dashboard
</commit_message>
<xml_diff>
--- a/Paul_Bonte_P7_03_Présentation.pptx
+++ b/Paul_Bonte_P7_03_Présentation.pptx
@@ -6,6 +6,14 @@
   </p:sldMasterIdLst>
   <p:sldIdLst>
     <p:sldId id="256" r:id="rId2"/>
+    <p:sldId id="257" r:id="rId3"/>
+    <p:sldId id="258" r:id="rId4"/>
+    <p:sldId id="259" r:id="rId5"/>
+    <p:sldId id="260" r:id="rId6"/>
+    <p:sldId id="261" r:id="rId7"/>
+    <p:sldId id="262" r:id="rId8"/>
+    <p:sldId id="263" r:id="rId9"/>
+    <p:sldId id="264" r:id="rId10"/>
   </p:sldIdLst>
   <p:sldSz cx="12192000" cy="6858000"/>
   <p:notesSz cx="6858000" cy="9144000"/>
@@ -104,6 +112,11 @@
       </a:defRPr>
     </a:lvl9pPr>
   </p:defaultTextStyle>
+  <p:extLst>
+    <p:ext uri="{EFAFB233-063F-42B5-8137-9DF3F51BA10A}">
+      <p15:sldGuideLst xmlns:p15="http://schemas.microsoft.com/office/powerpoint/2012/main"/>
+    </p:ext>
+  </p:extLst>
 </p:presentation>
 </file>
 
@@ -254,7 +267,7 @@
           <a:p>
             <a:fld id="{031E606A-FED5-4545-9851-5AFDEBEF6356}" type="datetimeFigureOut">
               <a:rPr lang="fr-FR" smtClean="0"/>
-              <a:t>15/02/2022</a:t>
+              <a:t>17/03/2022</a:t>
             </a:fld>
             <a:endParaRPr lang="fr-FR"/>
           </a:p>
@@ -452,7 +465,7 @@
           <a:p>
             <a:fld id="{031E606A-FED5-4545-9851-5AFDEBEF6356}" type="datetimeFigureOut">
               <a:rPr lang="fr-FR" smtClean="0"/>
-              <a:t>15/02/2022</a:t>
+              <a:t>17/03/2022</a:t>
             </a:fld>
             <a:endParaRPr lang="fr-FR"/>
           </a:p>
@@ -660,7 +673,7 @@
           <a:p>
             <a:fld id="{031E606A-FED5-4545-9851-5AFDEBEF6356}" type="datetimeFigureOut">
               <a:rPr lang="fr-FR" smtClean="0"/>
-              <a:t>15/02/2022</a:t>
+              <a:t>17/03/2022</a:t>
             </a:fld>
             <a:endParaRPr lang="fr-FR"/>
           </a:p>
@@ -858,7 +871,7 @@
           <a:p>
             <a:fld id="{031E606A-FED5-4545-9851-5AFDEBEF6356}" type="datetimeFigureOut">
               <a:rPr lang="fr-FR" smtClean="0"/>
-              <a:t>15/02/2022</a:t>
+              <a:t>17/03/2022</a:t>
             </a:fld>
             <a:endParaRPr lang="fr-FR"/>
           </a:p>
@@ -1133,7 +1146,7 @@
           <a:p>
             <a:fld id="{031E606A-FED5-4545-9851-5AFDEBEF6356}" type="datetimeFigureOut">
               <a:rPr lang="fr-FR" smtClean="0"/>
-              <a:t>15/02/2022</a:t>
+              <a:t>17/03/2022</a:t>
             </a:fld>
             <a:endParaRPr lang="fr-FR"/>
           </a:p>
@@ -1398,7 +1411,7 @@
           <a:p>
             <a:fld id="{031E606A-FED5-4545-9851-5AFDEBEF6356}" type="datetimeFigureOut">
               <a:rPr lang="fr-FR" smtClean="0"/>
-              <a:t>15/02/2022</a:t>
+              <a:t>17/03/2022</a:t>
             </a:fld>
             <a:endParaRPr lang="fr-FR"/>
           </a:p>
@@ -1810,7 +1823,7 @@
           <a:p>
             <a:fld id="{031E606A-FED5-4545-9851-5AFDEBEF6356}" type="datetimeFigureOut">
               <a:rPr lang="fr-FR" smtClean="0"/>
-              <a:t>15/02/2022</a:t>
+              <a:t>17/03/2022</a:t>
             </a:fld>
             <a:endParaRPr lang="fr-FR"/>
           </a:p>
@@ -1951,7 +1964,7 @@
           <a:p>
             <a:fld id="{031E606A-FED5-4545-9851-5AFDEBEF6356}" type="datetimeFigureOut">
               <a:rPr lang="fr-FR" smtClean="0"/>
-              <a:t>15/02/2022</a:t>
+              <a:t>17/03/2022</a:t>
             </a:fld>
             <a:endParaRPr lang="fr-FR"/>
           </a:p>
@@ -2064,7 +2077,7 @@
           <a:p>
             <a:fld id="{031E606A-FED5-4545-9851-5AFDEBEF6356}" type="datetimeFigureOut">
               <a:rPr lang="fr-FR" smtClean="0"/>
-              <a:t>15/02/2022</a:t>
+              <a:t>17/03/2022</a:t>
             </a:fld>
             <a:endParaRPr lang="fr-FR"/>
           </a:p>
@@ -2375,7 +2388,7 @@
           <a:p>
             <a:fld id="{031E606A-FED5-4545-9851-5AFDEBEF6356}" type="datetimeFigureOut">
               <a:rPr lang="fr-FR" smtClean="0"/>
-              <a:t>15/02/2022</a:t>
+              <a:t>17/03/2022</a:t>
             </a:fld>
             <a:endParaRPr lang="fr-FR"/>
           </a:p>
@@ -2663,7 +2676,7 @@
           <a:p>
             <a:fld id="{031E606A-FED5-4545-9851-5AFDEBEF6356}" type="datetimeFigureOut">
               <a:rPr lang="fr-FR" smtClean="0"/>
-              <a:t>15/02/2022</a:t>
+              <a:t>17/03/2022</a:t>
             </a:fld>
             <a:endParaRPr lang="fr-FR"/>
           </a:p>
@@ -2904,7 +2917,7 @@
           <a:p>
             <a:fld id="{031E606A-FED5-4545-9851-5AFDEBEF6356}" type="datetimeFigureOut">
               <a:rPr lang="fr-FR" smtClean="0"/>
-              <a:t>15/02/2022</a:t>
+              <a:t>17/03/2022</a:t>
             </a:fld>
             <a:endParaRPr lang="fr-FR"/>
           </a:p>
@@ -3323,51 +3336,134 @@
       </p:grpSpPr>
       <p:sp>
         <p:nvSpPr>
-          <p:cNvPr id="2" name="Titre 1">
-            <a:extLst>
-              <a:ext uri="{FF2B5EF4-FFF2-40B4-BE49-F238E27FC236}">
-                <a16:creationId xmlns:a16="http://schemas.microsoft.com/office/drawing/2014/main" id="{70E8B0AE-74B8-4488-ACEE-28D10321A502}"/>
-              </a:ext>
-            </a:extLst>
-          </p:cNvPr>
-          <p:cNvSpPr>
-            <a:spLocks noGrp="1"/>
-          </p:cNvSpPr>
-          <p:nvPr>
-            <p:ph type="ctrTitle"/>
-          </p:nvPr>
-        </p:nvSpPr>
-        <p:spPr/>
-        <p:txBody>
-          <a:bodyPr/>
-          <a:lstStyle/>
-          <a:p>
+          <p:cNvPr id="6" name="Rectangle 5">
+            <a:extLst>
+              <a:ext uri="{FF2B5EF4-FFF2-40B4-BE49-F238E27FC236}">
+                <a16:creationId xmlns:a16="http://schemas.microsoft.com/office/drawing/2014/main" id="{0CE170EA-7423-41E9-A26A-371A1DE2F68D}"/>
+              </a:ext>
+            </a:extLst>
+          </p:cNvPr>
+          <p:cNvSpPr/>
+          <p:nvPr/>
+        </p:nvSpPr>
+        <p:spPr>
+          <a:xfrm>
+            <a:off x="0" y="0"/>
+            <a:ext cx="12192000" cy="6858000"/>
+          </a:xfrm>
+          <a:prstGeom prst="rect">
+            <a:avLst/>
+          </a:prstGeom>
+          <a:solidFill>
+            <a:srgbClr val="D7D8D7"/>
+          </a:solidFill>
+          <a:ln>
+            <a:solidFill>
+              <a:srgbClr val="D7D8D7"/>
+            </a:solidFill>
+          </a:ln>
+        </p:spPr>
+        <p:style>
+          <a:lnRef idx="2">
+            <a:schemeClr val="accent1">
+              <a:shade val="50000"/>
+            </a:schemeClr>
+          </a:lnRef>
+          <a:fillRef idx="1">
+            <a:schemeClr val="accent1"/>
+          </a:fillRef>
+          <a:effectRef idx="0">
+            <a:schemeClr val="accent1"/>
+          </a:effectRef>
+          <a:fontRef idx="minor">
+            <a:schemeClr val="lt1"/>
+          </a:fontRef>
+        </p:style>
+        <p:txBody>
+          <a:bodyPr rtlCol="0" anchor="ctr"/>
+          <a:lstStyle/>
+          <a:p>
+            <a:pPr algn="ctr"/>
             <a:endParaRPr lang="fr-FR"/>
           </a:p>
         </p:txBody>
       </p:sp>
-      <p:sp>
-        <p:nvSpPr>
-          <p:cNvPr id="3" name="Sous-titre 2">
-            <a:extLst>
-              <a:ext uri="{FF2B5EF4-FFF2-40B4-BE49-F238E27FC236}">
-                <a16:creationId xmlns:a16="http://schemas.microsoft.com/office/drawing/2014/main" id="{F69BA86B-97E9-41D5-926B-F00D6D95E373}"/>
-              </a:ext>
-            </a:extLst>
-          </p:cNvPr>
-          <p:cNvSpPr>
-            <a:spLocks noGrp="1"/>
-          </p:cNvSpPr>
-          <p:nvPr>
-            <p:ph type="subTitle" idx="1"/>
-          </p:nvPr>
-        </p:nvSpPr>
-        <p:spPr/>
-        <p:txBody>
-          <a:bodyPr/>
-          <a:lstStyle/>
-          <a:p>
-            <a:endParaRPr lang="fr-FR"/>
+      <p:pic>
+        <p:nvPicPr>
+          <p:cNvPr id="5" name="Image 4">
+            <a:extLst>
+              <a:ext uri="{FF2B5EF4-FFF2-40B4-BE49-F238E27FC236}">
+                <a16:creationId xmlns:a16="http://schemas.microsoft.com/office/drawing/2014/main" id="{F68BA480-B319-45EB-94D9-AFB60A5A1593}"/>
+              </a:ext>
+            </a:extLst>
+          </p:cNvPr>
+          <p:cNvPicPr>
+            <a:picLocks noChangeAspect="1"/>
+          </p:cNvPicPr>
+          <p:nvPr/>
+        </p:nvPicPr>
+        <p:blipFill rotWithShape="1">
+          <a:blip r:embed="rId2"/>
+          <a:srcRect l="2655" t="1501" r="2750" b="4090"/>
+          <a:stretch/>
+        </p:blipFill>
+        <p:spPr>
+          <a:xfrm>
+            <a:off x="4598633" y="2015232"/>
+            <a:ext cx="2991775" cy="2752078"/>
+          </a:xfrm>
+          <a:prstGeom prst="rect">
+            <a:avLst/>
+          </a:prstGeom>
+        </p:spPr>
+      </p:pic>
+      <p:sp>
+        <p:nvSpPr>
+          <p:cNvPr id="9" name="ZoneTexte 8">
+            <a:extLst>
+              <a:ext uri="{FF2B5EF4-FFF2-40B4-BE49-F238E27FC236}">
+                <a16:creationId xmlns:a16="http://schemas.microsoft.com/office/drawing/2014/main" id="{DBC477E9-F3A6-465C-A8E1-28E6146D82B8}"/>
+              </a:ext>
+            </a:extLst>
+          </p:cNvPr>
+          <p:cNvSpPr txBox="1"/>
+          <p:nvPr/>
+        </p:nvSpPr>
+        <p:spPr>
+          <a:xfrm>
+            <a:off x="4017146" y="4767310"/>
+            <a:ext cx="6098958" cy="369332"/>
+          </a:xfrm>
+          <a:prstGeom prst="rect">
+            <a:avLst/>
+          </a:prstGeom>
+          <a:noFill/>
+        </p:spPr>
+        <p:txBody>
+          <a:bodyPr wrap="square">
+            <a:spAutoFit/>
+          </a:bodyPr>
+          <a:lstStyle/>
+          <a:p>
+            <a:pPr algn="l"/>
+            <a:r>
+              <a:rPr lang="fr-FR" b="1" i="0" dirty="0">
+                <a:effectLst/>
+                <a:latin typeface="Montserrat" panose="00000500000000000000" pitchFamily="2" charset="0"/>
+              </a:rPr>
+              <a:t>Implémentez un modèle de </a:t>
+            </a:r>
+            <a:r>
+              <a:rPr lang="fr-FR" b="1" i="0" dirty="0" err="1">
+                <a:effectLst/>
+                <a:latin typeface="Montserrat" panose="00000500000000000000" pitchFamily="2" charset="0"/>
+              </a:rPr>
+              <a:t>scoring</a:t>
+            </a:r>
+            <a:endParaRPr lang="fr-FR" b="1" i="0" dirty="0">
+              <a:effectLst/>
+              <a:latin typeface="Montserrat" panose="00000500000000000000" pitchFamily="2" charset="0"/>
+            </a:endParaRPr>
           </a:p>
         </p:txBody>
       </p:sp>
@@ -3375,6 +3471,1079 @@
     <p:extLst>
       <p:ext uri="{BB962C8B-B14F-4D97-AF65-F5344CB8AC3E}">
         <p14:creationId xmlns:p14="http://schemas.microsoft.com/office/powerpoint/2010/main" val="2320149800"/>
+      </p:ext>
+    </p:extLst>
+  </p:cSld>
+  <p:clrMapOvr>
+    <a:masterClrMapping/>
+  </p:clrMapOvr>
+</p:sld>
+</file>
+
+<file path=ppt/slides/slide2.xml><?xml version="1.0" encoding="utf-8"?>
+<p:sld xmlns:a="http://schemas.openxmlformats.org/drawingml/2006/main" xmlns:r="http://schemas.openxmlformats.org/officeDocument/2006/relationships" xmlns:p="http://schemas.openxmlformats.org/presentationml/2006/main">
+  <p:cSld>
+    <p:spTree>
+      <p:nvGrpSpPr>
+        <p:cNvPr id="1" name=""/>
+        <p:cNvGrpSpPr/>
+        <p:nvPr/>
+      </p:nvGrpSpPr>
+      <p:grpSpPr>
+        <a:xfrm>
+          <a:off x="0" y="0"/>
+          <a:ext cx="0" cy="0"/>
+          <a:chOff x="0" y="0"/>
+          <a:chExt cx="0" cy="0"/>
+        </a:xfrm>
+      </p:grpSpPr>
+      <p:sp>
+        <p:nvSpPr>
+          <p:cNvPr id="4" name="Rectangle 3">
+            <a:extLst>
+              <a:ext uri="{FF2B5EF4-FFF2-40B4-BE49-F238E27FC236}">
+                <a16:creationId xmlns:a16="http://schemas.microsoft.com/office/drawing/2014/main" id="{DB320C1A-E1A6-409C-BA2E-18BF6D92F415}"/>
+              </a:ext>
+            </a:extLst>
+          </p:cNvPr>
+          <p:cNvSpPr/>
+          <p:nvPr/>
+        </p:nvSpPr>
+        <p:spPr>
+          <a:xfrm>
+            <a:off x="0" y="0"/>
+            <a:ext cx="12192000" cy="6858000"/>
+          </a:xfrm>
+          <a:prstGeom prst="rect">
+            <a:avLst/>
+          </a:prstGeom>
+          <a:solidFill>
+            <a:srgbClr val="D7D8D7"/>
+          </a:solidFill>
+          <a:ln>
+            <a:solidFill>
+              <a:srgbClr val="D7D8D7"/>
+            </a:solidFill>
+          </a:ln>
+        </p:spPr>
+        <p:style>
+          <a:lnRef idx="2">
+            <a:schemeClr val="accent1">
+              <a:shade val="50000"/>
+            </a:schemeClr>
+          </a:lnRef>
+          <a:fillRef idx="1">
+            <a:schemeClr val="accent1"/>
+          </a:fillRef>
+          <a:effectRef idx="0">
+            <a:schemeClr val="accent1"/>
+          </a:effectRef>
+          <a:fontRef idx="minor">
+            <a:schemeClr val="lt1"/>
+          </a:fontRef>
+        </p:style>
+        <p:txBody>
+          <a:bodyPr rtlCol="0" anchor="ctr"/>
+          <a:lstStyle/>
+          <a:p>
+            <a:pPr algn="ctr"/>
+            <a:endParaRPr lang="fr-FR"/>
+          </a:p>
+        </p:txBody>
+      </p:sp>
+      <p:sp>
+        <p:nvSpPr>
+          <p:cNvPr id="2" name="Titre 1">
+            <a:extLst>
+              <a:ext uri="{FF2B5EF4-FFF2-40B4-BE49-F238E27FC236}">
+                <a16:creationId xmlns:a16="http://schemas.microsoft.com/office/drawing/2014/main" id="{1243ED1C-1A07-4F34-B448-CA06D63523F7}"/>
+              </a:ext>
+            </a:extLst>
+          </p:cNvPr>
+          <p:cNvSpPr>
+            <a:spLocks noGrp="1"/>
+          </p:cNvSpPr>
+          <p:nvPr>
+            <p:ph type="title"/>
+          </p:nvPr>
+        </p:nvSpPr>
+        <p:spPr/>
+        <p:txBody>
+          <a:bodyPr/>
+          <a:lstStyle/>
+          <a:p>
+            <a:r>
+              <a:rPr lang="fr-FR" sz="4800" b="1" dirty="0"/>
+              <a:t>Sommaire</a:t>
+            </a:r>
+            <a:endParaRPr lang="fr-FR" b="1" dirty="0"/>
+          </a:p>
+        </p:txBody>
+      </p:sp>
+      <p:sp>
+        <p:nvSpPr>
+          <p:cNvPr id="3" name="ZoneTexte 2">
+            <a:extLst>
+              <a:ext uri="{FF2B5EF4-FFF2-40B4-BE49-F238E27FC236}">
+                <a16:creationId xmlns:a16="http://schemas.microsoft.com/office/drawing/2014/main" id="{EC30CB24-E66B-4346-B917-F4E855C190FF}"/>
+              </a:ext>
+            </a:extLst>
+          </p:cNvPr>
+          <p:cNvSpPr txBox="1"/>
+          <p:nvPr/>
+        </p:nvSpPr>
+        <p:spPr>
+          <a:xfrm>
+            <a:off x="838200" y="1619666"/>
+            <a:ext cx="6688562" cy="4992457"/>
+          </a:xfrm>
+          <a:prstGeom prst="rect">
+            <a:avLst/>
+          </a:prstGeom>
+          <a:noFill/>
+        </p:spPr>
+        <p:txBody>
+          <a:bodyPr wrap="none" rtlCol="0">
+            <a:spAutoFit/>
+          </a:bodyPr>
+          <a:lstStyle/>
+          <a:p>
+            <a:pPr>
+              <a:lnSpc>
+                <a:spcPct val="150000"/>
+              </a:lnSpc>
+            </a:pPr>
+            <a:r>
+              <a:rPr lang="fr-FR" sz="3600" dirty="0"/>
+              <a:t>1. Rappel de la problématique</a:t>
+            </a:r>
+          </a:p>
+          <a:p>
+            <a:pPr>
+              <a:lnSpc>
+                <a:spcPct val="150000"/>
+              </a:lnSpc>
+            </a:pPr>
+            <a:r>
+              <a:rPr lang="fr-FR" sz="3600" dirty="0"/>
+              <a:t>2. Présentation du jeu de données </a:t>
+            </a:r>
+          </a:p>
+          <a:p>
+            <a:pPr>
+              <a:lnSpc>
+                <a:spcPct val="150000"/>
+              </a:lnSpc>
+            </a:pPr>
+            <a:r>
+              <a:rPr lang="fr-FR" sz="3600" dirty="0"/>
+              <a:t>3. Modélisation</a:t>
+            </a:r>
+          </a:p>
+          <a:p>
+            <a:pPr>
+              <a:lnSpc>
+                <a:spcPct val="150000"/>
+              </a:lnSpc>
+            </a:pPr>
+            <a:r>
+              <a:rPr lang="fr-FR" sz="3600" dirty="0"/>
+              <a:t>4. Outils</a:t>
+            </a:r>
+          </a:p>
+          <a:p>
+            <a:pPr>
+              <a:lnSpc>
+                <a:spcPct val="150000"/>
+              </a:lnSpc>
+            </a:pPr>
+            <a:r>
+              <a:rPr lang="fr-FR" sz="3600" dirty="0"/>
+              <a:t>5. Dashboard</a:t>
+            </a:r>
+          </a:p>
+          <a:p>
+            <a:pPr>
+              <a:lnSpc>
+                <a:spcPct val="150000"/>
+              </a:lnSpc>
+            </a:pPr>
+            <a:endParaRPr lang="fr-FR" sz="3600" dirty="0"/>
+          </a:p>
+        </p:txBody>
+      </p:sp>
+    </p:spTree>
+    <p:extLst>
+      <p:ext uri="{BB962C8B-B14F-4D97-AF65-F5344CB8AC3E}">
+        <p14:creationId xmlns:p14="http://schemas.microsoft.com/office/powerpoint/2010/main" val="804682713"/>
+      </p:ext>
+    </p:extLst>
+  </p:cSld>
+  <p:clrMapOvr>
+    <a:masterClrMapping/>
+  </p:clrMapOvr>
+</p:sld>
+</file>
+
+<file path=ppt/slides/slide3.xml><?xml version="1.0" encoding="utf-8"?>
+<p:sld xmlns:a="http://schemas.openxmlformats.org/drawingml/2006/main" xmlns:r="http://schemas.openxmlformats.org/officeDocument/2006/relationships" xmlns:p="http://schemas.openxmlformats.org/presentationml/2006/main">
+  <p:cSld>
+    <p:spTree>
+      <p:nvGrpSpPr>
+        <p:cNvPr id="1" name=""/>
+        <p:cNvGrpSpPr/>
+        <p:nvPr/>
+      </p:nvGrpSpPr>
+      <p:grpSpPr>
+        <a:xfrm>
+          <a:off x="0" y="0"/>
+          <a:ext cx="0" cy="0"/>
+          <a:chOff x="0" y="0"/>
+          <a:chExt cx="0" cy="0"/>
+        </a:xfrm>
+      </p:grpSpPr>
+      <p:sp>
+        <p:nvSpPr>
+          <p:cNvPr id="4" name="Rectangle 3">
+            <a:extLst>
+              <a:ext uri="{FF2B5EF4-FFF2-40B4-BE49-F238E27FC236}">
+                <a16:creationId xmlns:a16="http://schemas.microsoft.com/office/drawing/2014/main" id="{DB320C1A-E1A6-409C-BA2E-18BF6D92F415}"/>
+              </a:ext>
+            </a:extLst>
+          </p:cNvPr>
+          <p:cNvSpPr/>
+          <p:nvPr/>
+        </p:nvSpPr>
+        <p:spPr>
+          <a:xfrm>
+            <a:off x="0" y="0"/>
+            <a:ext cx="12192000" cy="6858000"/>
+          </a:xfrm>
+          <a:prstGeom prst="rect">
+            <a:avLst/>
+          </a:prstGeom>
+          <a:solidFill>
+            <a:srgbClr val="D7D8D7"/>
+          </a:solidFill>
+          <a:ln>
+            <a:solidFill>
+              <a:srgbClr val="D7D8D7"/>
+            </a:solidFill>
+          </a:ln>
+        </p:spPr>
+        <p:style>
+          <a:lnRef idx="2">
+            <a:schemeClr val="accent1">
+              <a:shade val="50000"/>
+            </a:schemeClr>
+          </a:lnRef>
+          <a:fillRef idx="1">
+            <a:schemeClr val="accent1"/>
+          </a:fillRef>
+          <a:effectRef idx="0">
+            <a:schemeClr val="accent1"/>
+          </a:effectRef>
+          <a:fontRef idx="minor">
+            <a:schemeClr val="lt1"/>
+          </a:fontRef>
+        </p:style>
+        <p:txBody>
+          <a:bodyPr rtlCol="0" anchor="ctr"/>
+          <a:lstStyle/>
+          <a:p>
+            <a:pPr algn="ctr"/>
+            <a:endParaRPr lang="fr-FR"/>
+          </a:p>
+        </p:txBody>
+      </p:sp>
+      <p:sp>
+        <p:nvSpPr>
+          <p:cNvPr id="2" name="Titre 1">
+            <a:extLst>
+              <a:ext uri="{FF2B5EF4-FFF2-40B4-BE49-F238E27FC236}">
+                <a16:creationId xmlns:a16="http://schemas.microsoft.com/office/drawing/2014/main" id="{1243ED1C-1A07-4F34-B448-CA06D63523F7}"/>
+              </a:ext>
+            </a:extLst>
+          </p:cNvPr>
+          <p:cNvSpPr>
+            <a:spLocks noGrp="1"/>
+          </p:cNvSpPr>
+          <p:nvPr>
+            <p:ph type="title"/>
+          </p:nvPr>
+        </p:nvSpPr>
+        <p:spPr/>
+        <p:txBody>
+          <a:bodyPr/>
+          <a:lstStyle/>
+          <a:p>
+            <a:r>
+              <a:rPr lang="fr-FR" sz="4800" b="1" dirty="0"/>
+              <a:t>1. Rappel de la problématique</a:t>
+            </a:r>
+            <a:endParaRPr lang="fr-FR" b="1" dirty="0"/>
+          </a:p>
+        </p:txBody>
+      </p:sp>
+      <p:sp>
+        <p:nvSpPr>
+          <p:cNvPr id="6" name="ZoneTexte 5">
+            <a:extLst>
+              <a:ext uri="{FF2B5EF4-FFF2-40B4-BE49-F238E27FC236}">
+                <a16:creationId xmlns:a16="http://schemas.microsoft.com/office/drawing/2014/main" id="{41B1159C-D952-4890-907C-59C48E5CB1A7}"/>
+              </a:ext>
+            </a:extLst>
+          </p:cNvPr>
+          <p:cNvSpPr txBox="1"/>
+          <p:nvPr/>
+        </p:nvSpPr>
+        <p:spPr>
+          <a:xfrm>
+            <a:off x="1016493" y="1619667"/>
+            <a:ext cx="10515599" cy="646331"/>
+          </a:xfrm>
+          <a:prstGeom prst="rect">
+            <a:avLst/>
+          </a:prstGeom>
+          <a:noFill/>
+        </p:spPr>
+        <p:txBody>
+          <a:bodyPr wrap="square">
+            <a:spAutoFit/>
+          </a:bodyPr>
+          <a:lstStyle/>
+          <a:p>
+            <a:pPr algn="ctr"/>
+            <a:r>
+              <a:rPr lang="fr-FR" b="1" i="0" dirty="0">
+                <a:effectLst/>
+                <a:latin typeface="Montserrat" panose="00000500000000000000" pitchFamily="2" charset="0"/>
+              </a:rPr>
+              <a:t>"Prêt à dépenser"</a:t>
+            </a:r>
+            <a:r>
+              <a:rPr lang="fr-FR" b="0" i="0" dirty="0">
+                <a:effectLst/>
+                <a:latin typeface="Montserrat" panose="00000500000000000000" pitchFamily="2" charset="0"/>
+              </a:rPr>
+              <a:t>,  qui propose des crédits à la consommation pour des personnes ayant peu ou pas du tout d'historique de prêt.</a:t>
+            </a:r>
+            <a:endParaRPr lang="fr-FR" dirty="0"/>
+          </a:p>
+        </p:txBody>
+      </p:sp>
+    </p:spTree>
+    <p:extLst>
+      <p:ext uri="{BB962C8B-B14F-4D97-AF65-F5344CB8AC3E}">
+        <p14:creationId xmlns:p14="http://schemas.microsoft.com/office/powerpoint/2010/main" val="1370668125"/>
+      </p:ext>
+    </p:extLst>
+  </p:cSld>
+  <p:clrMapOvr>
+    <a:masterClrMapping/>
+  </p:clrMapOvr>
+</p:sld>
+</file>
+
+<file path=ppt/slides/slide4.xml><?xml version="1.0" encoding="utf-8"?>
+<p:sld xmlns:a="http://schemas.openxmlformats.org/drawingml/2006/main" xmlns:r="http://schemas.openxmlformats.org/officeDocument/2006/relationships" xmlns:p="http://schemas.openxmlformats.org/presentationml/2006/main">
+  <p:cSld>
+    <p:spTree>
+      <p:nvGrpSpPr>
+        <p:cNvPr id="1" name=""/>
+        <p:cNvGrpSpPr/>
+        <p:nvPr/>
+      </p:nvGrpSpPr>
+      <p:grpSpPr>
+        <a:xfrm>
+          <a:off x="0" y="0"/>
+          <a:ext cx="0" cy="0"/>
+          <a:chOff x="0" y="0"/>
+          <a:chExt cx="0" cy="0"/>
+        </a:xfrm>
+      </p:grpSpPr>
+      <p:sp>
+        <p:nvSpPr>
+          <p:cNvPr id="4" name="Rectangle 3">
+            <a:extLst>
+              <a:ext uri="{FF2B5EF4-FFF2-40B4-BE49-F238E27FC236}">
+                <a16:creationId xmlns:a16="http://schemas.microsoft.com/office/drawing/2014/main" id="{DB320C1A-E1A6-409C-BA2E-18BF6D92F415}"/>
+              </a:ext>
+            </a:extLst>
+          </p:cNvPr>
+          <p:cNvSpPr/>
+          <p:nvPr/>
+        </p:nvSpPr>
+        <p:spPr>
+          <a:xfrm>
+            <a:off x="0" y="0"/>
+            <a:ext cx="12192000" cy="6858000"/>
+          </a:xfrm>
+          <a:prstGeom prst="rect">
+            <a:avLst/>
+          </a:prstGeom>
+          <a:solidFill>
+            <a:srgbClr val="D7D8D7"/>
+          </a:solidFill>
+          <a:ln>
+            <a:solidFill>
+              <a:srgbClr val="D7D8D7"/>
+            </a:solidFill>
+          </a:ln>
+        </p:spPr>
+        <p:style>
+          <a:lnRef idx="2">
+            <a:schemeClr val="accent1">
+              <a:shade val="50000"/>
+            </a:schemeClr>
+          </a:lnRef>
+          <a:fillRef idx="1">
+            <a:schemeClr val="accent1"/>
+          </a:fillRef>
+          <a:effectRef idx="0">
+            <a:schemeClr val="accent1"/>
+          </a:effectRef>
+          <a:fontRef idx="minor">
+            <a:schemeClr val="lt1"/>
+          </a:fontRef>
+        </p:style>
+        <p:txBody>
+          <a:bodyPr rtlCol="0" anchor="ctr"/>
+          <a:lstStyle/>
+          <a:p>
+            <a:pPr algn="ctr"/>
+            <a:endParaRPr lang="fr-FR"/>
+          </a:p>
+        </p:txBody>
+      </p:sp>
+      <p:sp>
+        <p:nvSpPr>
+          <p:cNvPr id="2" name="Titre 1">
+            <a:extLst>
+              <a:ext uri="{FF2B5EF4-FFF2-40B4-BE49-F238E27FC236}">
+                <a16:creationId xmlns:a16="http://schemas.microsoft.com/office/drawing/2014/main" id="{1243ED1C-1A07-4F34-B448-CA06D63523F7}"/>
+              </a:ext>
+            </a:extLst>
+          </p:cNvPr>
+          <p:cNvSpPr>
+            <a:spLocks noGrp="1"/>
+          </p:cNvSpPr>
+          <p:nvPr>
+            <p:ph type="title"/>
+          </p:nvPr>
+        </p:nvSpPr>
+        <p:spPr/>
+        <p:txBody>
+          <a:bodyPr/>
+          <a:lstStyle/>
+          <a:p>
+            <a:r>
+              <a:rPr lang="fr-FR" sz="4800" b="1" dirty="0"/>
+              <a:t>2. Présentation du jeu de données</a:t>
+            </a:r>
+            <a:endParaRPr lang="fr-FR" b="1" dirty="0"/>
+          </a:p>
+        </p:txBody>
+      </p:sp>
+    </p:spTree>
+    <p:extLst>
+      <p:ext uri="{BB962C8B-B14F-4D97-AF65-F5344CB8AC3E}">
+        <p14:creationId xmlns:p14="http://schemas.microsoft.com/office/powerpoint/2010/main" val="2067346435"/>
+      </p:ext>
+    </p:extLst>
+  </p:cSld>
+  <p:clrMapOvr>
+    <a:masterClrMapping/>
+  </p:clrMapOvr>
+</p:sld>
+</file>
+
+<file path=ppt/slides/slide5.xml><?xml version="1.0" encoding="utf-8"?>
+<p:sld xmlns:a="http://schemas.openxmlformats.org/drawingml/2006/main" xmlns:r="http://schemas.openxmlformats.org/officeDocument/2006/relationships" xmlns:p="http://schemas.openxmlformats.org/presentationml/2006/main">
+  <p:cSld>
+    <p:spTree>
+      <p:nvGrpSpPr>
+        <p:cNvPr id="1" name=""/>
+        <p:cNvGrpSpPr/>
+        <p:nvPr/>
+      </p:nvGrpSpPr>
+      <p:grpSpPr>
+        <a:xfrm>
+          <a:off x="0" y="0"/>
+          <a:ext cx="0" cy="0"/>
+          <a:chOff x="0" y="0"/>
+          <a:chExt cx="0" cy="0"/>
+        </a:xfrm>
+      </p:grpSpPr>
+      <p:sp>
+        <p:nvSpPr>
+          <p:cNvPr id="4" name="Rectangle 3">
+            <a:extLst>
+              <a:ext uri="{FF2B5EF4-FFF2-40B4-BE49-F238E27FC236}">
+                <a16:creationId xmlns:a16="http://schemas.microsoft.com/office/drawing/2014/main" id="{DB320C1A-E1A6-409C-BA2E-18BF6D92F415}"/>
+              </a:ext>
+            </a:extLst>
+          </p:cNvPr>
+          <p:cNvSpPr/>
+          <p:nvPr/>
+        </p:nvSpPr>
+        <p:spPr>
+          <a:xfrm>
+            <a:off x="0" y="0"/>
+            <a:ext cx="12192000" cy="6858000"/>
+          </a:xfrm>
+          <a:prstGeom prst="rect">
+            <a:avLst/>
+          </a:prstGeom>
+          <a:solidFill>
+            <a:srgbClr val="D7D8D7"/>
+          </a:solidFill>
+          <a:ln>
+            <a:solidFill>
+              <a:srgbClr val="D7D8D7"/>
+            </a:solidFill>
+          </a:ln>
+        </p:spPr>
+        <p:style>
+          <a:lnRef idx="2">
+            <a:schemeClr val="accent1">
+              <a:shade val="50000"/>
+            </a:schemeClr>
+          </a:lnRef>
+          <a:fillRef idx="1">
+            <a:schemeClr val="accent1"/>
+          </a:fillRef>
+          <a:effectRef idx="0">
+            <a:schemeClr val="accent1"/>
+          </a:effectRef>
+          <a:fontRef idx="minor">
+            <a:schemeClr val="lt1"/>
+          </a:fontRef>
+        </p:style>
+        <p:txBody>
+          <a:bodyPr rtlCol="0" anchor="ctr"/>
+          <a:lstStyle/>
+          <a:p>
+            <a:pPr algn="ctr"/>
+            <a:endParaRPr lang="fr-FR"/>
+          </a:p>
+        </p:txBody>
+      </p:sp>
+      <p:sp>
+        <p:nvSpPr>
+          <p:cNvPr id="2" name="Titre 1">
+            <a:extLst>
+              <a:ext uri="{FF2B5EF4-FFF2-40B4-BE49-F238E27FC236}">
+                <a16:creationId xmlns:a16="http://schemas.microsoft.com/office/drawing/2014/main" id="{1243ED1C-1A07-4F34-B448-CA06D63523F7}"/>
+              </a:ext>
+            </a:extLst>
+          </p:cNvPr>
+          <p:cNvSpPr>
+            <a:spLocks noGrp="1"/>
+          </p:cNvSpPr>
+          <p:nvPr>
+            <p:ph type="title"/>
+          </p:nvPr>
+        </p:nvSpPr>
+        <p:spPr/>
+        <p:txBody>
+          <a:bodyPr>
+            <a:normAutofit/>
+          </a:bodyPr>
+          <a:lstStyle/>
+          <a:p>
+            <a:r>
+              <a:rPr lang="fr-FR" sz="4800" b="1" dirty="0"/>
+              <a:t>2. </a:t>
+            </a:r>
+            <a:r>
+              <a:rPr lang="fr-FR" sz="4800" b="1" dirty="0" err="1"/>
+              <a:t>Feature</a:t>
+            </a:r>
+            <a:r>
+              <a:rPr lang="fr-FR" sz="4800" b="1" dirty="0"/>
+              <a:t> engineering</a:t>
+            </a:r>
+            <a:endParaRPr lang="fr-FR" b="1" dirty="0"/>
+          </a:p>
+        </p:txBody>
+      </p:sp>
+    </p:spTree>
+    <p:extLst>
+      <p:ext uri="{BB962C8B-B14F-4D97-AF65-F5344CB8AC3E}">
+        <p14:creationId xmlns:p14="http://schemas.microsoft.com/office/powerpoint/2010/main" val="1893412092"/>
+      </p:ext>
+    </p:extLst>
+  </p:cSld>
+  <p:clrMapOvr>
+    <a:masterClrMapping/>
+  </p:clrMapOvr>
+</p:sld>
+</file>
+
+<file path=ppt/slides/slide6.xml><?xml version="1.0" encoding="utf-8"?>
+<p:sld xmlns:a="http://schemas.openxmlformats.org/drawingml/2006/main" xmlns:r="http://schemas.openxmlformats.org/officeDocument/2006/relationships" xmlns:p="http://schemas.openxmlformats.org/presentationml/2006/main">
+  <p:cSld>
+    <p:spTree>
+      <p:nvGrpSpPr>
+        <p:cNvPr id="1" name=""/>
+        <p:cNvGrpSpPr/>
+        <p:nvPr/>
+      </p:nvGrpSpPr>
+      <p:grpSpPr>
+        <a:xfrm>
+          <a:off x="0" y="0"/>
+          <a:ext cx="0" cy="0"/>
+          <a:chOff x="0" y="0"/>
+          <a:chExt cx="0" cy="0"/>
+        </a:xfrm>
+      </p:grpSpPr>
+      <p:sp>
+        <p:nvSpPr>
+          <p:cNvPr id="4" name="Rectangle 3">
+            <a:extLst>
+              <a:ext uri="{FF2B5EF4-FFF2-40B4-BE49-F238E27FC236}">
+                <a16:creationId xmlns:a16="http://schemas.microsoft.com/office/drawing/2014/main" id="{DB320C1A-E1A6-409C-BA2E-18BF6D92F415}"/>
+              </a:ext>
+            </a:extLst>
+          </p:cNvPr>
+          <p:cNvSpPr/>
+          <p:nvPr/>
+        </p:nvSpPr>
+        <p:spPr>
+          <a:xfrm>
+            <a:off x="0" y="0"/>
+            <a:ext cx="12192000" cy="6858000"/>
+          </a:xfrm>
+          <a:prstGeom prst="rect">
+            <a:avLst/>
+          </a:prstGeom>
+          <a:solidFill>
+            <a:srgbClr val="D7D8D7"/>
+          </a:solidFill>
+          <a:ln>
+            <a:solidFill>
+              <a:srgbClr val="D7D8D7"/>
+            </a:solidFill>
+          </a:ln>
+        </p:spPr>
+        <p:style>
+          <a:lnRef idx="2">
+            <a:schemeClr val="accent1">
+              <a:shade val="50000"/>
+            </a:schemeClr>
+          </a:lnRef>
+          <a:fillRef idx="1">
+            <a:schemeClr val="accent1"/>
+          </a:fillRef>
+          <a:effectRef idx="0">
+            <a:schemeClr val="accent1"/>
+          </a:effectRef>
+          <a:fontRef idx="minor">
+            <a:schemeClr val="lt1"/>
+          </a:fontRef>
+        </p:style>
+        <p:txBody>
+          <a:bodyPr rtlCol="0" anchor="ctr"/>
+          <a:lstStyle/>
+          <a:p>
+            <a:pPr algn="ctr"/>
+            <a:endParaRPr lang="fr-FR"/>
+          </a:p>
+        </p:txBody>
+      </p:sp>
+      <p:sp>
+        <p:nvSpPr>
+          <p:cNvPr id="2" name="Titre 1">
+            <a:extLst>
+              <a:ext uri="{FF2B5EF4-FFF2-40B4-BE49-F238E27FC236}">
+                <a16:creationId xmlns:a16="http://schemas.microsoft.com/office/drawing/2014/main" id="{1243ED1C-1A07-4F34-B448-CA06D63523F7}"/>
+              </a:ext>
+            </a:extLst>
+          </p:cNvPr>
+          <p:cNvSpPr>
+            <a:spLocks noGrp="1"/>
+          </p:cNvSpPr>
+          <p:nvPr>
+            <p:ph type="title"/>
+          </p:nvPr>
+        </p:nvSpPr>
+        <p:spPr/>
+        <p:txBody>
+          <a:bodyPr>
+            <a:normAutofit/>
+          </a:bodyPr>
+          <a:lstStyle/>
+          <a:p>
+            <a:r>
+              <a:rPr lang="fr-FR" sz="4800" b="1" dirty="0"/>
+              <a:t>2. Des données déséquilibrés</a:t>
+            </a:r>
+            <a:endParaRPr lang="fr-FR" b="1" dirty="0"/>
+          </a:p>
+        </p:txBody>
+      </p:sp>
+    </p:spTree>
+    <p:extLst>
+      <p:ext uri="{BB962C8B-B14F-4D97-AF65-F5344CB8AC3E}">
+        <p14:creationId xmlns:p14="http://schemas.microsoft.com/office/powerpoint/2010/main" val="1992527769"/>
+      </p:ext>
+    </p:extLst>
+  </p:cSld>
+  <p:clrMapOvr>
+    <a:masterClrMapping/>
+  </p:clrMapOvr>
+</p:sld>
+</file>
+
+<file path=ppt/slides/slide7.xml><?xml version="1.0" encoding="utf-8"?>
+<p:sld xmlns:a="http://schemas.openxmlformats.org/drawingml/2006/main" xmlns:r="http://schemas.openxmlformats.org/officeDocument/2006/relationships" xmlns:p="http://schemas.openxmlformats.org/presentationml/2006/main">
+  <p:cSld>
+    <p:spTree>
+      <p:nvGrpSpPr>
+        <p:cNvPr id="1" name=""/>
+        <p:cNvGrpSpPr/>
+        <p:nvPr/>
+      </p:nvGrpSpPr>
+      <p:grpSpPr>
+        <a:xfrm>
+          <a:off x="0" y="0"/>
+          <a:ext cx="0" cy="0"/>
+          <a:chOff x="0" y="0"/>
+          <a:chExt cx="0" cy="0"/>
+        </a:xfrm>
+      </p:grpSpPr>
+      <p:sp>
+        <p:nvSpPr>
+          <p:cNvPr id="4" name="Rectangle 3">
+            <a:extLst>
+              <a:ext uri="{FF2B5EF4-FFF2-40B4-BE49-F238E27FC236}">
+                <a16:creationId xmlns:a16="http://schemas.microsoft.com/office/drawing/2014/main" id="{DB320C1A-E1A6-409C-BA2E-18BF6D92F415}"/>
+              </a:ext>
+            </a:extLst>
+          </p:cNvPr>
+          <p:cNvSpPr/>
+          <p:nvPr/>
+        </p:nvSpPr>
+        <p:spPr>
+          <a:xfrm>
+            <a:off x="0" y="0"/>
+            <a:ext cx="12192000" cy="6858000"/>
+          </a:xfrm>
+          <a:prstGeom prst="rect">
+            <a:avLst/>
+          </a:prstGeom>
+          <a:solidFill>
+            <a:srgbClr val="D7D8D7"/>
+          </a:solidFill>
+          <a:ln>
+            <a:solidFill>
+              <a:srgbClr val="D7D8D7"/>
+            </a:solidFill>
+          </a:ln>
+        </p:spPr>
+        <p:style>
+          <a:lnRef idx="2">
+            <a:schemeClr val="accent1">
+              <a:shade val="50000"/>
+            </a:schemeClr>
+          </a:lnRef>
+          <a:fillRef idx="1">
+            <a:schemeClr val="accent1"/>
+          </a:fillRef>
+          <a:effectRef idx="0">
+            <a:schemeClr val="accent1"/>
+          </a:effectRef>
+          <a:fontRef idx="minor">
+            <a:schemeClr val="lt1"/>
+          </a:fontRef>
+        </p:style>
+        <p:txBody>
+          <a:bodyPr rtlCol="0" anchor="ctr"/>
+          <a:lstStyle/>
+          <a:p>
+            <a:pPr algn="ctr"/>
+            <a:endParaRPr lang="fr-FR"/>
+          </a:p>
+        </p:txBody>
+      </p:sp>
+      <p:sp>
+        <p:nvSpPr>
+          <p:cNvPr id="2" name="Titre 1">
+            <a:extLst>
+              <a:ext uri="{FF2B5EF4-FFF2-40B4-BE49-F238E27FC236}">
+                <a16:creationId xmlns:a16="http://schemas.microsoft.com/office/drawing/2014/main" id="{1243ED1C-1A07-4F34-B448-CA06D63523F7}"/>
+              </a:ext>
+            </a:extLst>
+          </p:cNvPr>
+          <p:cNvSpPr>
+            <a:spLocks noGrp="1"/>
+          </p:cNvSpPr>
+          <p:nvPr>
+            <p:ph type="title"/>
+          </p:nvPr>
+        </p:nvSpPr>
+        <p:spPr/>
+        <p:txBody>
+          <a:bodyPr>
+            <a:normAutofit/>
+          </a:bodyPr>
+          <a:lstStyle/>
+          <a:p>
+            <a:r>
+              <a:rPr lang="fr-FR" sz="4800" b="1" dirty="0"/>
+              <a:t>3. Modélisation : </a:t>
+            </a:r>
+            <a:r>
+              <a:rPr lang="fr-FR" sz="4800" b="1" dirty="0" err="1"/>
+              <a:t>preprocessing</a:t>
+            </a:r>
+            <a:endParaRPr lang="fr-FR" b="1" dirty="0"/>
+          </a:p>
+        </p:txBody>
+      </p:sp>
+    </p:spTree>
+    <p:extLst>
+      <p:ext uri="{BB962C8B-B14F-4D97-AF65-F5344CB8AC3E}">
+        <p14:creationId xmlns:p14="http://schemas.microsoft.com/office/powerpoint/2010/main" val="3655932663"/>
+      </p:ext>
+    </p:extLst>
+  </p:cSld>
+  <p:clrMapOvr>
+    <a:masterClrMapping/>
+  </p:clrMapOvr>
+</p:sld>
+</file>
+
+<file path=ppt/slides/slide8.xml><?xml version="1.0" encoding="utf-8"?>
+<p:sld xmlns:a="http://schemas.openxmlformats.org/drawingml/2006/main" xmlns:r="http://schemas.openxmlformats.org/officeDocument/2006/relationships" xmlns:p="http://schemas.openxmlformats.org/presentationml/2006/main">
+  <p:cSld>
+    <p:spTree>
+      <p:nvGrpSpPr>
+        <p:cNvPr id="1" name=""/>
+        <p:cNvGrpSpPr/>
+        <p:nvPr/>
+      </p:nvGrpSpPr>
+      <p:grpSpPr>
+        <a:xfrm>
+          <a:off x="0" y="0"/>
+          <a:ext cx="0" cy="0"/>
+          <a:chOff x="0" y="0"/>
+          <a:chExt cx="0" cy="0"/>
+        </a:xfrm>
+      </p:grpSpPr>
+      <p:sp>
+        <p:nvSpPr>
+          <p:cNvPr id="4" name="Rectangle 3">
+            <a:extLst>
+              <a:ext uri="{FF2B5EF4-FFF2-40B4-BE49-F238E27FC236}">
+                <a16:creationId xmlns:a16="http://schemas.microsoft.com/office/drawing/2014/main" id="{DB320C1A-E1A6-409C-BA2E-18BF6D92F415}"/>
+              </a:ext>
+            </a:extLst>
+          </p:cNvPr>
+          <p:cNvSpPr/>
+          <p:nvPr/>
+        </p:nvSpPr>
+        <p:spPr>
+          <a:xfrm>
+            <a:off x="0" y="0"/>
+            <a:ext cx="12192000" cy="6858000"/>
+          </a:xfrm>
+          <a:prstGeom prst="rect">
+            <a:avLst/>
+          </a:prstGeom>
+          <a:solidFill>
+            <a:srgbClr val="D7D8D7"/>
+          </a:solidFill>
+          <a:ln>
+            <a:solidFill>
+              <a:srgbClr val="D7D8D7"/>
+            </a:solidFill>
+          </a:ln>
+        </p:spPr>
+        <p:style>
+          <a:lnRef idx="2">
+            <a:schemeClr val="accent1">
+              <a:shade val="50000"/>
+            </a:schemeClr>
+          </a:lnRef>
+          <a:fillRef idx="1">
+            <a:schemeClr val="accent1"/>
+          </a:fillRef>
+          <a:effectRef idx="0">
+            <a:schemeClr val="accent1"/>
+          </a:effectRef>
+          <a:fontRef idx="minor">
+            <a:schemeClr val="lt1"/>
+          </a:fontRef>
+        </p:style>
+        <p:txBody>
+          <a:bodyPr rtlCol="0" anchor="ctr"/>
+          <a:lstStyle/>
+          <a:p>
+            <a:pPr algn="ctr"/>
+            <a:endParaRPr lang="fr-FR"/>
+          </a:p>
+        </p:txBody>
+      </p:sp>
+      <p:sp>
+        <p:nvSpPr>
+          <p:cNvPr id="2" name="Titre 1">
+            <a:extLst>
+              <a:ext uri="{FF2B5EF4-FFF2-40B4-BE49-F238E27FC236}">
+                <a16:creationId xmlns:a16="http://schemas.microsoft.com/office/drawing/2014/main" id="{1243ED1C-1A07-4F34-B448-CA06D63523F7}"/>
+              </a:ext>
+            </a:extLst>
+          </p:cNvPr>
+          <p:cNvSpPr>
+            <a:spLocks noGrp="1"/>
+          </p:cNvSpPr>
+          <p:nvPr>
+            <p:ph type="title"/>
+          </p:nvPr>
+        </p:nvSpPr>
+        <p:spPr/>
+        <p:txBody>
+          <a:bodyPr>
+            <a:normAutofit/>
+          </a:bodyPr>
+          <a:lstStyle/>
+          <a:p>
+            <a:r>
+              <a:rPr lang="fr-FR" sz="4800" b="1" dirty="0"/>
+              <a:t>3. Les modèles mis en </a:t>
+            </a:r>
+            <a:r>
+              <a:rPr lang="fr-FR" sz="4800" b="1" dirty="0" err="1"/>
+              <a:t>oeuvre</a:t>
+            </a:r>
+            <a:endParaRPr lang="fr-FR" b="1" dirty="0"/>
+          </a:p>
+        </p:txBody>
+      </p:sp>
+    </p:spTree>
+    <p:extLst>
+      <p:ext uri="{BB962C8B-B14F-4D97-AF65-F5344CB8AC3E}">
+        <p14:creationId xmlns:p14="http://schemas.microsoft.com/office/powerpoint/2010/main" val="3722083207"/>
+      </p:ext>
+    </p:extLst>
+  </p:cSld>
+  <p:clrMapOvr>
+    <a:masterClrMapping/>
+  </p:clrMapOvr>
+</p:sld>
+</file>
+
+<file path=ppt/slides/slide9.xml><?xml version="1.0" encoding="utf-8"?>
+<p:sld xmlns:a="http://schemas.openxmlformats.org/drawingml/2006/main" xmlns:r="http://schemas.openxmlformats.org/officeDocument/2006/relationships" xmlns:p="http://schemas.openxmlformats.org/presentationml/2006/main">
+  <p:cSld>
+    <p:spTree>
+      <p:nvGrpSpPr>
+        <p:cNvPr id="1" name=""/>
+        <p:cNvGrpSpPr/>
+        <p:nvPr/>
+      </p:nvGrpSpPr>
+      <p:grpSpPr>
+        <a:xfrm>
+          <a:off x="0" y="0"/>
+          <a:ext cx="0" cy="0"/>
+          <a:chOff x="0" y="0"/>
+          <a:chExt cx="0" cy="0"/>
+        </a:xfrm>
+      </p:grpSpPr>
+      <p:sp>
+        <p:nvSpPr>
+          <p:cNvPr id="4" name="Rectangle 3">
+            <a:extLst>
+              <a:ext uri="{FF2B5EF4-FFF2-40B4-BE49-F238E27FC236}">
+                <a16:creationId xmlns:a16="http://schemas.microsoft.com/office/drawing/2014/main" id="{DB320C1A-E1A6-409C-BA2E-18BF6D92F415}"/>
+              </a:ext>
+            </a:extLst>
+          </p:cNvPr>
+          <p:cNvSpPr/>
+          <p:nvPr/>
+        </p:nvSpPr>
+        <p:spPr>
+          <a:xfrm>
+            <a:off x="0" y="0"/>
+            <a:ext cx="12192000" cy="6858000"/>
+          </a:xfrm>
+          <a:prstGeom prst="rect">
+            <a:avLst/>
+          </a:prstGeom>
+          <a:solidFill>
+            <a:srgbClr val="D7D8D7"/>
+          </a:solidFill>
+          <a:ln>
+            <a:solidFill>
+              <a:srgbClr val="D7D8D7"/>
+            </a:solidFill>
+          </a:ln>
+        </p:spPr>
+        <p:style>
+          <a:lnRef idx="2">
+            <a:schemeClr val="accent1">
+              <a:shade val="50000"/>
+            </a:schemeClr>
+          </a:lnRef>
+          <a:fillRef idx="1">
+            <a:schemeClr val="accent1"/>
+          </a:fillRef>
+          <a:effectRef idx="0">
+            <a:schemeClr val="accent1"/>
+          </a:effectRef>
+          <a:fontRef idx="minor">
+            <a:schemeClr val="lt1"/>
+          </a:fontRef>
+        </p:style>
+        <p:txBody>
+          <a:bodyPr rtlCol="0" anchor="ctr"/>
+          <a:lstStyle/>
+          <a:p>
+            <a:pPr algn="ctr"/>
+            <a:endParaRPr lang="fr-FR"/>
+          </a:p>
+        </p:txBody>
+      </p:sp>
+      <p:sp>
+        <p:nvSpPr>
+          <p:cNvPr id="2" name="Titre 1">
+            <a:extLst>
+              <a:ext uri="{FF2B5EF4-FFF2-40B4-BE49-F238E27FC236}">
+                <a16:creationId xmlns:a16="http://schemas.microsoft.com/office/drawing/2014/main" id="{1243ED1C-1A07-4F34-B448-CA06D63523F7}"/>
+              </a:ext>
+            </a:extLst>
+          </p:cNvPr>
+          <p:cNvSpPr>
+            <a:spLocks noGrp="1"/>
+          </p:cNvSpPr>
+          <p:nvPr>
+            <p:ph type="title"/>
+          </p:nvPr>
+        </p:nvSpPr>
+        <p:spPr/>
+        <p:txBody>
+          <a:bodyPr>
+            <a:normAutofit/>
+          </a:bodyPr>
+          <a:lstStyle/>
+          <a:p>
+            <a:r>
+              <a:rPr lang="fr-FR" sz="4800" b="1" dirty="0"/>
+              <a:t>3. Les modèles mis en </a:t>
+            </a:r>
+            <a:r>
+              <a:rPr lang="fr-FR" sz="4800" b="1" dirty="0" err="1"/>
+              <a:t>oeuvre</a:t>
+            </a:r>
+            <a:endParaRPr lang="fr-FR" b="1" dirty="0"/>
+          </a:p>
+        </p:txBody>
+      </p:sp>
+    </p:spTree>
+    <p:extLst>
+      <p:ext uri="{BB962C8B-B14F-4D97-AF65-F5344CB8AC3E}">
+        <p14:creationId xmlns:p14="http://schemas.microsoft.com/office/powerpoint/2010/main" val="3251911696"/>
       </p:ext>
     </p:extLst>
   </p:cSld>

</xml_diff>